<commit_message>
docker app debug post draft
</commit_message>
<xml_diff>
--- a/images/pics_slides/pics_slides.pptx
+++ b/images/pics_slides/pics_slides.pptx
@@ -8,6 +8,7 @@
     <p:sldId id="256" r:id="rId2"/>
     <p:sldId id="257" r:id="rId3"/>
     <p:sldId id="258" r:id="rId4"/>
+    <p:sldId id="259" r:id="rId5"/>
   </p:sldIdLst>
   <p:sldSz cx="12192000" cy="6858000"/>
   <p:notesSz cx="6858000" cy="9144000"/>
@@ -245,7 +246,7 @@
           <a:p>
             <a:fld id="{4A31C449-260C-4C88-9D36-C81523339FAD}" type="datetimeFigureOut">
               <a:rPr lang="en-US" smtClean="0"/>
-              <a:t>2/28/2022</a:t>
+              <a:t>3/14/2022</a:t>
             </a:fld>
             <a:endParaRPr lang="en-US"/>
           </a:p>
@@ -415,7 +416,7 @@
           <a:p>
             <a:fld id="{4A31C449-260C-4C88-9D36-C81523339FAD}" type="datetimeFigureOut">
               <a:rPr lang="en-US" smtClean="0"/>
-              <a:t>2/28/2022</a:t>
+              <a:t>3/14/2022</a:t>
             </a:fld>
             <a:endParaRPr lang="en-US"/>
           </a:p>
@@ -595,7 +596,7 @@
           <a:p>
             <a:fld id="{4A31C449-260C-4C88-9D36-C81523339FAD}" type="datetimeFigureOut">
               <a:rPr lang="en-US" smtClean="0"/>
-              <a:t>2/28/2022</a:t>
+              <a:t>3/14/2022</a:t>
             </a:fld>
             <a:endParaRPr lang="en-US"/>
           </a:p>
@@ -765,7 +766,7 @@
           <a:p>
             <a:fld id="{4A31C449-260C-4C88-9D36-C81523339FAD}" type="datetimeFigureOut">
               <a:rPr lang="en-US" smtClean="0"/>
-              <a:t>2/28/2022</a:t>
+              <a:t>3/14/2022</a:t>
             </a:fld>
             <a:endParaRPr lang="en-US"/>
           </a:p>
@@ -1011,7 +1012,7 @@
           <a:p>
             <a:fld id="{4A31C449-260C-4C88-9D36-C81523339FAD}" type="datetimeFigureOut">
               <a:rPr lang="en-US" smtClean="0"/>
-              <a:t>2/28/2022</a:t>
+              <a:t>3/14/2022</a:t>
             </a:fld>
             <a:endParaRPr lang="en-US"/>
           </a:p>
@@ -1243,7 +1244,7 @@
           <a:p>
             <a:fld id="{4A31C449-260C-4C88-9D36-C81523339FAD}" type="datetimeFigureOut">
               <a:rPr lang="en-US" smtClean="0"/>
-              <a:t>2/28/2022</a:t>
+              <a:t>3/14/2022</a:t>
             </a:fld>
             <a:endParaRPr lang="en-US"/>
           </a:p>
@@ -1610,7 +1611,7 @@
           <a:p>
             <a:fld id="{4A31C449-260C-4C88-9D36-C81523339FAD}" type="datetimeFigureOut">
               <a:rPr lang="en-US" smtClean="0"/>
-              <a:t>2/28/2022</a:t>
+              <a:t>3/14/2022</a:t>
             </a:fld>
             <a:endParaRPr lang="en-US"/>
           </a:p>
@@ -1728,7 +1729,7 @@
           <a:p>
             <a:fld id="{4A31C449-260C-4C88-9D36-C81523339FAD}" type="datetimeFigureOut">
               <a:rPr lang="en-US" smtClean="0"/>
-              <a:t>2/28/2022</a:t>
+              <a:t>3/14/2022</a:t>
             </a:fld>
             <a:endParaRPr lang="en-US"/>
           </a:p>
@@ -1823,7 +1824,7 @@
           <a:p>
             <a:fld id="{4A31C449-260C-4C88-9D36-C81523339FAD}" type="datetimeFigureOut">
               <a:rPr lang="en-US" smtClean="0"/>
-              <a:t>2/28/2022</a:t>
+              <a:t>3/14/2022</a:t>
             </a:fld>
             <a:endParaRPr lang="en-US"/>
           </a:p>
@@ -2100,7 +2101,7 @@
           <a:p>
             <a:fld id="{4A31C449-260C-4C88-9D36-C81523339FAD}" type="datetimeFigureOut">
               <a:rPr lang="en-US" smtClean="0"/>
-              <a:t>2/28/2022</a:t>
+              <a:t>3/14/2022</a:t>
             </a:fld>
             <a:endParaRPr lang="en-US"/>
           </a:p>
@@ -2353,7 +2354,7 @@
           <a:p>
             <a:fld id="{4A31C449-260C-4C88-9D36-C81523339FAD}" type="datetimeFigureOut">
               <a:rPr lang="en-US" smtClean="0"/>
-              <a:t>2/28/2022</a:t>
+              <a:t>3/14/2022</a:t>
             </a:fld>
             <a:endParaRPr lang="en-US"/>
           </a:p>
@@ -2566,7 +2567,7 @@
           <a:p>
             <a:fld id="{4A31C449-260C-4C88-9D36-C81523339FAD}" type="datetimeFigureOut">
               <a:rPr lang="en-US" smtClean="0"/>
-              <a:t>2/28/2022</a:t>
+              <a:t>3/14/2022</a:t>
             </a:fld>
             <a:endParaRPr lang="en-US"/>
           </a:p>
@@ -4074,7 +4075,7 @@
             <p:cNvPr id="4" name="Graphic 21">
               <a:extLst>
                 <a:ext uri="{FF2B5EF4-FFF2-40B4-BE49-F238E27FC236}">
-                  <a16:creationId xmlns="" xmlns:a16="http://schemas.microsoft.com/office/drawing/2014/main" xmlns:lc="http://schemas.openxmlformats.org/drawingml/2006/lockedCanvas" id="{4320B773-4CEB-E940-A9DD-79DF6FCDEFCB}"/>
+                  <a16:creationId xmlns:lc="http://schemas.openxmlformats.org/drawingml/2006/lockedCanvas" xmlns:a16="http://schemas.microsoft.com/office/drawing/2014/main" xmlns="" id="{4320B773-4CEB-E940-A9DD-79DF6FCDEFCB}"/>
                 </a:ext>
               </a:extLst>
             </p:cNvPr>
@@ -4134,7 +4135,7 @@
             <p:cNvPr id="5" name="TextBox 12">
               <a:extLst>
                 <a:ext uri="{FF2B5EF4-FFF2-40B4-BE49-F238E27FC236}">
-                  <a16:creationId xmlns="" xmlns:a16="http://schemas.microsoft.com/office/drawing/2014/main" xmlns:lc="http://schemas.openxmlformats.org/drawingml/2006/lockedCanvas" id="{5CC1F16D-CB68-B24B-90B1-3A527B9AF19A}"/>
+                  <a16:creationId xmlns:lc="http://schemas.openxmlformats.org/drawingml/2006/lockedCanvas" xmlns:a16="http://schemas.microsoft.com/office/drawing/2014/main" xmlns="" id="{5CC1F16D-CB68-B24B-90B1-3A527B9AF19A}"/>
                 </a:ext>
               </a:extLst>
             </p:cNvPr>
@@ -4322,6 +4323,179 @@
     <p:extLst>
       <p:ext uri="{BB962C8B-B14F-4D97-AF65-F5344CB8AC3E}">
         <p14:creationId xmlns:p14="http://schemas.microsoft.com/office/powerpoint/2010/main" val="3380984913"/>
+      </p:ext>
+    </p:extLst>
+  </p:cSld>
+  <p:clrMapOvr>
+    <a:masterClrMapping/>
+  </p:clrMapOvr>
+</p:sld>
+</file>
+
+<file path=ppt/slides/slide4.xml><?xml version="1.0" encoding="utf-8"?>
+<p:sld xmlns:a="http://schemas.openxmlformats.org/drawingml/2006/main" xmlns:r="http://schemas.openxmlformats.org/officeDocument/2006/relationships" xmlns:p="http://schemas.openxmlformats.org/presentationml/2006/main">
+  <p:cSld>
+    <p:spTree>
+      <p:nvGrpSpPr>
+        <p:cNvPr id="1" name=""/>
+        <p:cNvGrpSpPr/>
+        <p:nvPr/>
+      </p:nvGrpSpPr>
+      <p:grpSpPr>
+        <a:xfrm>
+          <a:off x="0" y="0"/>
+          <a:ext cx="0" cy="0"/>
+          <a:chOff x="0" y="0"/>
+          <a:chExt cx="0" cy="0"/>
+        </a:xfrm>
+      </p:grpSpPr>
+      <p:grpSp>
+        <p:nvGrpSpPr>
+          <p:cNvPr id="13" name="Group 12"/>
+          <p:cNvGrpSpPr/>
+          <p:nvPr/>
+        </p:nvGrpSpPr>
+        <p:grpSpPr>
+          <a:xfrm>
+            <a:off x="-1580626" y="389646"/>
+            <a:ext cx="13772626" cy="6078707"/>
+            <a:chOff x="-1580626" y="389646"/>
+            <a:chExt cx="13772626" cy="6078707"/>
+          </a:xfrm>
+        </p:grpSpPr>
+        <p:pic>
+          <p:nvPicPr>
+            <p:cNvPr id="4" name="Picture 3"/>
+            <p:cNvPicPr>
+              <a:picLocks noChangeAspect="1"/>
+            </p:cNvPicPr>
+            <p:nvPr/>
+          </p:nvPicPr>
+          <p:blipFill>
+            <a:blip r:embed="rId2">
+              <a:extLst>
+                <a:ext uri="{28A0092B-C50C-407E-A947-70E740481C1C}">
+                  <a14:useLocalDpi xmlns:a14="http://schemas.microsoft.com/office/drawing/2010/main" val="0"/>
+                </a:ext>
+              </a:extLst>
+            </a:blip>
+            <a:stretch>
+              <a:fillRect/>
+            </a:stretch>
+          </p:blipFill>
+          <p:spPr>
+            <a:xfrm>
+              <a:off x="0" y="389646"/>
+              <a:ext cx="12192000" cy="6078707"/>
+            </a:xfrm>
+            <a:prstGeom prst="rect">
+              <a:avLst/>
+            </a:prstGeom>
+          </p:spPr>
+        </p:pic>
+        <p:cxnSp>
+          <p:nvCxnSpPr>
+            <p:cNvPr id="6" name="Straight Arrow Connector 5"/>
+            <p:cNvCxnSpPr/>
+            <p:nvPr/>
+          </p:nvCxnSpPr>
+          <p:spPr>
+            <a:xfrm>
+              <a:off x="-546847" y="6293224"/>
+              <a:ext cx="546847" cy="5976"/>
+            </a:xfrm>
+            <a:prstGeom prst="straightConnector1">
+              <a:avLst/>
+            </a:prstGeom>
+            <a:ln w="57150">
+              <a:headEnd type="none" w="med" len="med"/>
+              <a:tailEnd type="arrow" w="med" len="med"/>
+            </a:ln>
+          </p:spPr>
+          <p:style>
+            <a:lnRef idx="3">
+              <a:schemeClr val="accent2"/>
+            </a:lnRef>
+            <a:fillRef idx="0">
+              <a:schemeClr val="accent2"/>
+            </a:fillRef>
+            <a:effectRef idx="2">
+              <a:schemeClr val="accent2"/>
+            </a:effectRef>
+            <a:fontRef idx="minor">
+              <a:schemeClr val="tx1"/>
+            </a:fontRef>
+          </p:style>
+        </p:cxnSp>
+        <p:sp>
+          <p:nvSpPr>
+            <p:cNvPr id="11" name="TextBox 10"/>
+            <p:cNvSpPr txBox="1"/>
+            <p:nvPr/>
+          </p:nvSpPr>
+          <p:spPr>
+            <a:xfrm>
+              <a:off x="-1580626" y="5695025"/>
+              <a:ext cx="1580626" cy="523220"/>
+            </a:xfrm>
+            <a:prstGeom prst="rect">
+              <a:avLst/>
+            </a:prstGeom>
+            <a:noFill/>
+          </p:spPr>
+          <p:txBody>
+            <a:bodyPr wrap="none" rtlCol="0">
+              <a:spAutoFit/>
+            </a:bodyPr>
+            <a:lstStyle/>
+            <a:p>
+              <a:r>
+                <a:rPr lang="en-US" sz="2800" b="1" dirty="0" smtClean="0"/>
+                <a:t>New Icon</a:t>
+              </a:r>
+              <a:endParaRPr lang="en-US" sz="2800" b="1" dirty="0"/>
+            </a:p>
+          </p:txBody>
+        </p:sp>
+        <p:cxnSp>
+          <p:nvCxnSpPr>
+            <p:cNvPr id="12" name="Straight Arrow Connector 11"/>
+            <p:cNvCxnSpPr/>
+            <p:nvPr/>
+          </p:nvCxnSpPr>
+          <p:spPr>
+            <a:xfrm>
+              <a:off x="4254555" y="2826525"/>
+              <a:ext cx="546847" cy="5976"/>
+            </a:xfrm>
+            <a:prstGeom prst="straightConnector1">
+              <a:avLst/>
+            </a:prstGeom>
+            <a:ln w="57150">
+              <a:headEnd type="arrow" w="med" len="med"/>
+              <a:tailEnd type="none" w="med" len="med"/>
+            </a:ln>
+          </p:spPr>
+          <p:style>
+            <a:lnRef idx="3">
+              <a:schemeClr val="accent2"/>
+            </a:lnRef>
+            <a:fillRef idx="0">
+              <a:schemeClr val="accent2"/>
+            </a:fillRef>
+            <a:effectRef idx="2">
+              <a:schemeClr val="accent2"/>
+            </a:effectRef>
+            <a:fontRef idx="minor">
+              <a:schemeClr val="tx1"/>
+            </a:fontRef>
+          </p:style>
+        </p:cxnSp>
+      </p:grpSp>
+    </p:spTree>
+    <p:extLst>
+      <p:ext uri="{BB962C8B-B14F-4D97-AF65-F5344CB8AC3E}">
+        <p14:creationId xmlns:p14="http://schemas.microsoft.com/office/powerpoint/2010/main" val="537937885"/>
       </p:ext>
     </p:extLst>
   </p:cSld>

</xml_diff>